<commit_message>
Update Exploring Scrum Team Performance.pptx
</commit_message>
<xml_diff>
--- a/Exploring Scrum Team Performance.pptx
+++ b/Exploring Scrum Team Performance.pptx
@@ -891,7 +891,7 @@
             <a:fld id="{4BF52324-0B82-D147-B8E5-85DC0726DF42}" type="datetime1">
               <a:rPr lang="en-US" smtClean="0"/>
               <a:pPr/>
-              <a:t>9/25/2019</a:t>
+              <a:t>11/26/2019</a:t>
             </a:fld>
             <a:endParaRPr lang="en-US"/>
           </a:p>
@@ -1059,7 +1059,7 @@
             <a:fld id="{87A25C76-DBD5-334A-9EDE-FC91227FE3EB}" type="datetime1">
               <a:rPr lang="en-US" smtClean="0"/>
               <a:pPr/>
-              <a:t>9/25/2019</a:t>
+              <a:t>11/26/2019</a:t>
             </a:fld>
             <a:endParaRPr lang="en-US"/>
           </a:p>
@@ -4022,7 +4022,7 @@
               <a:pPr>
                 <a:defRPr/>
               </a:pPr>
-              <a:t>9/25/2019</a:t>
+              <a:t>11/26/2019</a:t>
             </a:fld>
             <a:endParaRPr lang="en-US"/>
           </a:p>
@@ -4249,7 +4249,7 @@
               <a:pPr>
                 <a:defRPr/>
               </a:pPr>
-              <a:t>9/25/2019</a:t>
+              <a:t>11/26/2019</a:t>
             </a:fld>
             <a:endParaRPr lang="en-US"/>
           </a:p>
@@ -6035,7 +6035,7 @@
               <a:pPr>
                 <a:defRPr/>
               </a:pPr>
-              <a:t>9/25/2019</a:t>
+              <a:t>11/26/2019</a:t>
             </a:fld>
             <a:endParaRPr lang="en-US"/>
           </a:p>
@@ -7001,7 +7001,7 @@
               <a:pPr>
                 <a:defRPr/>
               </a:pPr>
-              <a:t>9/25/2019</a:t>
+              <a:t>11/26/2019</a:t>
             </a:fld>
             <a:endParaRPr lang="en-US"/>
           </a:p>
@@ -7662,7 +7662,7 @@
               <a:pPr>
                 <a:defRPr/>
               </a:pPr>
-              <a:t>9/25/2019</a:t>
+              <a:t>11/26/2019</a:t>
             </a:fld>
             <a:endParaRPr lang="en-US"/>
           </a:p>
@@ -7975,7 +7975,7 @@
               <a:pPr>
                 <a:defRPr/>
               </a:pPr>
-              <a:t>9/25/2019</a:t>
+              <a:t>11/26/2019</a:t>
             </a:fld>
             <a:endParaRPr lang="en-US"/>
           </a:p>
@@ -8236,7 +8236,7 @@
               <a:pPr>
                 <a:defRPr/>
               </a:pPr>
-              <a:t>9/25/2019</a:t>
+              <a:t>11/26/2019</a:t>
             </a:fld>
             <a:endParaRPr lang="en-US"/>
           </a:p>
@@ -8722,7 +8722,7 @@
             <a:fld id="{E277F4CE-098B-AC47-9403-6702D754860E}" type="datetimeFigureOut">
               <a:rPr lang="en-US" sz="900" smtClean="0"/>
               <a:pPr/>
-              <a:t>9/25/2019</a:t>
+              <a:t>11/26/2019</a:t>
             </a:fld>
             <a:endParaRPr lang="en-US" sz="900"/>
           </a:p>
@@ -11609,7 +11609,7 @@
               <a:pPr>
                 <a:defRPr/>
               </a:pPr>
-              <a:t>9/25/2019</a:t>
+              <a:t>11/26/2019</a:t>
             </a:fld>
             <a:endParaRPr lang="en-US"/>
           </a:p>
@@ -11892,7 +11892,7 @@
               <a:pPr>
                 <a:defRPr/>
               </a:pPr>
-              <a:t>9/25/2019</a:t>
+              <a:t>11/26/2019</a:t>
             </a:fld>
             <a:endParaRPr lang="en-US"/>
           </a:p>
@@ -15839,14 +15839,14 @@
             <p:ph idx="1"/>
             <p:extLst>
               <p:ext uri="{D42A27DB-BD31-4B8C-83A1-F6EECF244321}">
-                <p14:modId xmlns:p14="http://schemas.microsoft.com/office/powerpoint/2010/main" val="1042962621"/>
+                <p14:modId xmlns:p14="http://schemas.microsoft.com/office/powerpoint/2010/main" val="2839282908"/>
               </p:ext>
             </p:extLst>
           </p:nvPr>
         </p:nvGraphicFramePr>
         <p:xfrm>
           <a:off x="723900" y="895350"/>
-          <a:ext cx="7696200" cy="3056732"/>
+          <a:ext cx="7696200" cy="3361532"/>
         </p:xfrm>
         <a:graphic>
           <a:graphicData uri="http://schemas.openxmlformats.org/drawingml/2006/table">
@@ -15933,7 +15933,7 @@
                           <a:ea typeface="+mn-ea"/>
                           <a:cs typeface="+mn-cs"/>
                         </a:rPr>
-                        <a:t>Stakeholders </a:t>
+                        <a:t>Stakeholders attended vs invited</a:t>
                       </a:r>
                     </a:p>
                     <a:p>

</xml_diff>